<commit_message>
update continuous integration slides
</commit_message>
<xml_diff>
--- a/10_virtual_envs_and_continuous_integration/continous_integration.pptx
+++ b/10_virtual_envs_and_continuous_integration/continous_integration.pptx
@@ -139,18 +139,10 @@
 
 <file path=ppt/commentAuthors.xml><?xml version="1.0" encoding="utf-8"?>
 <p:cmAuthorLst xmlns:a="http://schemas.openxmlformats.org/drawingml/2006/main" xmlns:r="http://schemas.openxmlformats.org/officeDocument/2006/relationships" xmlns:p="http://schemas.openxmlformats.org/presentationml/2006/main">
-  <p:cmAuthor id="1" name="David A. Beck" initials="DAB" lastIdx="1" clrIdx="0">
-    <p:extLst/>
-  </p:cmAuthor>
-  <p:cmAuthor id="2" name="David A. Beck" initials="DAB [2]" lastIdx="1" clrIdx="1">
-    <p:extLst/>
-  </p:cmAuthor>
-  <p:cmAuthor id="3" name="David A. Beck" initials="DAB [2] [2]" lastIdx="1" clrIdx="2">
-    <p:extLst/>
-  </p:cmAuthor>
-  <p:cmAuthor id="4" name="David A. Beck" initials="DAB [3]" lastIdx="1" clrIdx="3">
-    <p:extLst/>
-  </p:cmAuthor>
+  <p:cmAuthor id="1" name="David A. Beck" initials="DAB" lastIdx="1" clrIdx="0"/>
+  <p:cmAuthor id="2" name="David A. Beck" initials="DAB [2]" lastIdx="1" clrIdx="1"/>
+  <p:cmAuthor id="3" name="David A. Beck" initials="DAB [2] [2]" lastIdx="1" clrIdx="2"/>
+  <p:cmAuthor id="4" name="David A. Beck" initials="DAB [3]" lastIdx="1" clrIdx="3"/>
 </p:cmAuthorLst>
 </file>
 
@@ -236,7 +228,7 @@
           <a:p>
             <a:fld id="{08F62E20-B1AA-3442-B8F1-F4A56998389D}" type="datetimeFigureOut">
               <a:rPr lang="en-US" smtClean="0"/>
-              <a:t>2/24/20</a:t>
+              <a:t>11/25/25</a:t>
             </a:fld>
             <a:endParaRPr lang="en-US"/>
           </a:p>
@@ -690,7 +682,7 @@
           <a:p>
             <a:fld id="{2691D6E4-0F7A-0249-86EF-226720E50E4C}" type="datetimeFigureOut">
               <a:rPr lang="en-US" smtClean="0"/>
-              <a:t>2/24/20</a:t>
+              <a:t>11/25/25</a:t>
             </a:fld>
             <a:endParaRPr lang="en-US"/>
           </a:p>
@@ -882,7 +874,7 @@
           <a:p>
             <a:fld id="{2691D6E4-0F7A-0249-86EF-226720E50E4C}" type="datetimeFigureOut">
               <a:rPr lang="en-US" smtClean="0"/>
-              <a:t>2/24/20</a:t>
+              <a:t>11/25/25</a:t>
             </a:fld>
             <a:endParaRPr lang="en-US"/>
           </a:p>
@@ -1084,7 +1076,7 @@
           <a:p>
             <a:fld id="{2691D6E4-0F7A-0249-86EF-226720E50E4C}" type="datetimeFigureOut">
               <a:rPr lang="en-US" smtClean="0"/>
-              <a:t>2/24/20</a:t>
+              <a:t>11/25/25</a:t>
             </a:fld>
             <a:endParaRPr lang="en-US"/>
           </a:p>
@@ -1276,7 +1268,7 @@
           <a:p>
             <a:fld id="{2691D6E4-0F7A-0249-86EF-226720E50E4C}" type="datetimeFigureOut">
               <a:rPr lang="en-US" smtClean="0"/>
-              <a:t>2/24/20</a:t>
+              <a:t>11/25/25</a:t>
             </a:fld>
             <a:endParaRPr lang="en-US"/>
           </a:p>
@@ -1545,7 +1537,7 @@
           <a:p>
             <a:fld id="{2691D6E4-0F7A-0249-86EF-226720E50E4C}" type="datetimeFigureOut">
               <a:rPr lang="en-US" smtClean="0"/>
-              <a:t>2/24/20</a:t>
+              <a:t>11/25/25</a:t>
             </a:fld>
             <a:endParaRPr lang="en-US"/>
           </a:p>
@@ -1854,7 +1846,7 @@
           <a:p>
             <a:fld id="{2691D6E4-0F7A-0249-86EF-226720E50E4C}" type="datetimeFigureOut">
               <a:rPr lang="en-US" smtClean="0"/>
-              <a:t>2/24/20</a:t>
+              <a:t>11/25/25</a:t>
             </a:fld>
             <a:endParaRPr lang="en-US"/>
           </a:p>
@@ -2297,7 +2289,7 @@
           <a:p>
             <a:fld id="{2691D6E4-0F7A-0249-86EF-226720E50E4C}" type="datetimeFigureOut">
               <a:rPr lang="en-US" smtClean="0"/>
-              <a:t>2/24/20</a:t>
+              <a:t>11/25/25</a:t>
             </a:fld>
             <a:endParaRPr lang="en-US"/>
           </a:p>
@@ -2438,7 +2430,7 @@
           <a:p>
             <a:fld id="{2691D6E4-0F7A-0249-86EF-226720E50E4C}" type="datetimeFigureOut">
               <a:rPr lang="en-US" smtClean="0"/>
-              <a:t>2/24/20</a:t>
+              <a:t>11/25/25</a:t>
             </a:fld>
             <a:endParaRPr lang="en-US"/>
           </a:p>
@@ -2557,7 +2549,7 @@
           <a:p>
             <a:fld id="{2691D6E4-0F7A-0249-86EF-226720E50E4C}" type="datetimeFigureOut">
               <a:rPr lang="en-US" smtClean="0"/>
-              <a:t>2/24/20</a:t>
+              <a:t>11/25/25</a:t>
             </a:fld>
             <a:endParaRPr lang="en-US"/>
           </a:p>
@@ -2856,7 +2848,7 @@
           <a:p>
             <a:fld id="{2691D6E4-0F7A-0249-86EF-226720E50E4C}" type="datetimeFigureOut">
               <a:rPr lang="en-US" smtClean="0"/>
-              <a:t>2/24/20</a:t>
+              <a:t>11/25/25</a:t>
             </a:fld>
             <a:endParaRPr lang="en-US"/>
           </a:p>
@@ -3132,7 +3124,7 @@
           <a:p>
             <a:fld id="{2691D6E4-0F7A-0249-86EF-226720E50E4C}" type="datetimeFigureOut">
               <a:rPr lang="en-US" smtClean="0"/>
-              <a:t>2/24/20</a:t>
+              <a:t>11/25/25</a:t>
             </a:fld>
             <a:endParaRPr lang="en-US"/>
           </a:p>
@@ -3812,7 +3804,13 @@
       </p:sp>
       <p:pic>
         <p:nvPicPr>
-          <p:cNvPr id="4" name="Picture 3"/>
+          <p:cNvPr id="8" name="Picture 7" descr="A screenshot of a computer&#10;&#10;AI-generated content may be incorrect.">
+            <a:extLst>
+              <a:ext uri="{FF2B5EF4-FFF2-40B4-BE49-F238E27FC236}">
+                <a16:creationId xmlns:a16="http://schemas.microsoft.com/office/drawing/2014/main" id="{5573066D-B05F-CCC6-600E-585895F1E8C3}"/>
+              </a:ext>
+            </a:extLst>
+          </p:cNvPr>
           <p:cNvPicPr>
             <a:picLocks noChangeAspect="1"/>
           </p:cNvPicPr>
@@ -3826,8 +3824,8 @@
         </p:blipFill>
         <p:spPr>
           <a:xfrm>
-            <a:off x="63405" y="0"/>
-            <a:ext cx="9017190" cy="6858000"/>
+            <a:off x="0" y="134797"/>
+            <a:ext cx="9144000" cy="6588406"/>
           </a:xfrm>
           <a:prstGeom prst="rect">
             <a:avLst/>
@@ -4191,10 +4189,16 @@
               <a:defRPr/>
             </a:pPr>
             <a:r>
+              <a:rPr lang="is-IS">
+                <a:latin typeface="Calibri" charset="0"/>
+              </a:rPr>
+              <a:t>See </a:t>
+            </a:r>
+            <a:r>
               <a:rPr lang="is-IS" dirty="0">
                 <a:latin typeface="Calibri" charset="0"/>
               </a:rPr>
-              <a:t>Some notes:</a:t>
+              <a:t>the example repository:</a:t>
             </a:r>
           </a:p>
           <a:p>
@@ -4207,93 +4211,12 @@
               <a:defRPr/>
             </a:pPr>
             <a:r>
-              <a:rPr lang="is-IS" dirty="0">
-                <a:latin typeface="Calibri" charset="0"/>
-              </a:rPr>
-              <a:t>The build container is an Ubuntu 14.04 install, but you can specify os: osx</a:t>
-            </a:r>
-          </a:p>
-          <a:p>
-            <a:pPr lvl="1">
-              <a:spcBef>
-                <a:spcPts val="800"/>
-              </a:spcBef>
-              <a:buFont typeface="Arial" charset="0"/>
-              <a:buChar char="•"/>
-              <a:defRPr/>
-            </a:pPr>
-            <a:endParaRPr lang="is-IS" dirty="0">
-              <a:latin typeface="Calibri" charset="0"/>
-            </a:endParaRPr>
-          </a:p>
-          <a:p>
-            <a:pPr>
-              <a:spcBef>
-                <a:spcPts val="800"/>
-              </a:spcBef>
-              <a:buFont typeface="Arial" charset="0"/>
-              <a:buChar char="•"/>
-              <a:defRPr/>
-            </a:pPr>
-            <a:r>
-              <a:rPr lang="is-IS" dirty="0">
-                <a:latin typeface="Calibri" charset="0"/>
-              </a:rPr>
-              <a:t>See the example repository:</a:t>
-            </a:r>
-          </a:p>
-          <a:p>
-            <a:pPr lvl="1">
-              <a:spcBef>
-                <a:spcPts val="800"/>
-              </a:spcBef>
-              <a:buFont typeface="Arial" charset="0"/>
-              <a:buChar char="•"/>
-              <a:defRPr/>
-            </a:pPr>
-            <a:r>
               <a:rPr lang="en-US" dirty="0">
                 <a:latin typeface="Calibri" charset="0"/>
                 <a:hlinkClick r:id="rId2"/>
               </a:rPr>
-              <a:t>https://github.com/dacb/codebase_conda</a:t>
-            </a:r>
-          </a:p>
-          <a:p>
-            <a:pPr lvl="1">
-              <a:spcBef>
-                <a:spcPts val="800"/>
-              </a:spcBef>
-              <a:buFont typeface="Arial" charset="0"/>
-              <a:buChar char="•"/>
-              <a:defRPr/>
-            </a:pPr>
-            <a:r>
-              <a:rPr lang="en-US" dirty="0">
-                <a:latin typeface="Calibri" charset="0"/>
-                <a:hlinkClick r:id="rId2"/>
-              </a:rPr>
-              <a:t>https://github.com/dacb/codebase</a:t>
-            </a:r>
-            <a:r>
-              <a:rPr lang="en-US" dirty="0">
-                <a:latin typeface="Calibri" charset="0"/>
-              </a:rPr>
-              <a:t> (PIP)</a:t>
-            </a:r>
-          </a:p>
-          <a:p>
-            <a:pPr lvl="1">
-              <a:spcBef>
-                <a:spcPts val="800"/>
-              </a:spcBef>
-              <a:buFont typeface="Arial" charset="0"/>
-              <a:buChar char="•"/>
-              <a:defRPr/>
-            </a:pPr>
-            <a:endParaRPr lang="is-IS" dirty="0">
-              <a:latin typeface="Calibri" charset="0"/>
-            </a:endParaRPr>
+              <a:t>https://github.com/UWSEDS/entropy_plus</a:t>
+            </a:r>
           </a:p>
         </p:txBody>
       </p:sp>

</xml_diff>